<commit_message>
DataBinding (knockout) example and some presentations
</commit_message>
<xml_diff>
--- a/Michael/NodeJs/Node-Presentation.pptx
+++ b/Michael/NodeJs/Node-Presentation.pptx
@@ -4,6 +4,11 @@
   <p:sldMasterIdLst>
     <p:sldMasterId id="2147483648" r:id="rId1"/>
   </p:sldMasterIdLst>
+  <p:sldIdLst>
+    <p:sldId id="256" r:id="rId2"/>
+    <p:sldId id="257" r:id="rId3"/>
+    <p:sldId id="258" r:id="rId4"/>
+  </p:sldIdLst>
   <p:sldSz cx="9144000" cy="6858000" type="screen4x3"/>
   <p:notesSz cx="6858000" cy="9144000"/>
   <p:defaultTextStyle>
@@ -286,7 +291,7 @@
             <a:fld id="{1D8BD707-D9CF-40AE-B4C6-C98DA3205C09}" type="datetimeFigureOut">
               <a:rPr lang="en-US" smtClean="0"/>
               <a:pPr/>
-              <a:t>9/18/2006</a:t>
+              <a:t>4/13/2015</a:t>
             </a:fld>
             <a:endParaRPr lang="en-US"/>
           </a:p>
@@ -453,7 +458,7 @@
             <a:fld id="{1D8BD707-D9CF-40AE-B4C6-C98DA3205C09}" type="datetimeFigureOut">
               <a:rPr lang="en-US" smtClean="0"/>
               <a:pPr/>
-              <a:t>9/18/2006</a:t>
+              <a:t>4/13/2015</a:t>
             </a:fld>
             <a:endParaRPr lang="en-US"/>
           </a:p>
@@ -630,7 +635,7 @@
             <a:fld id="{1D8BD707-D9CF-40AE-B4C6-C98DA3205C09}" type="datetimeFigureOut">
               <a:rPr lang="en-US" smtClean="0"/>
               <a:pPr/>
-              <a:t>9/18/2006</a:t>
+              <a:t>4/13/2015</a:t>
             </a:fld>
             <a:endParaRPr lang="en-US"/>
           </a:p>
@@ -797,7 +802,7 @@
             <a:fld id="{1D8BD707-D9CF-40AE-B4C6-C98DA3205C09}" type="datetimeFigureOut">
               <a:rPr lang="en-US" smtClean="0"/>
               <a:pPr/>
-              <a:t>9/18/2006</a:t>
+              <a:t>4/13/2015</a:t>
             </a:fld>
             <a:endParaRPr lang="en-US"/>
           </a:p>
@@ -1040,7 +1045,7 @@
             <a:fld id="{1D8BD707-D9CF-40AE-B4C6-C98DA3205C09}" type="datetimeFigureOut">
               <a:rPr lang="en-US" smtClean="0"/>
               <a:pPr/>
-              <a:t>9/18/2006</a:t>
+              <a:t>4/13/2015</a:t>
             </a:fld>
             <a:endParaRPr lang="en-US"/>
           </a:p>
@@ -1325,7 +1330,7 @@
             <a:fld id="{1D8BD707-D9CF-40AE-B4C6-C98DA3205C09}" type="datetimeFigureOut">
               <a:rPr lang="en-US" smtClean="0"/>
               <a:pPr/>
-              <a:t>9/18/2006</a:t>
+              <a:t>4/13/2015</a:t>
             </a:fld>
             <a:endParaRPr lang="en-US"/>
           </a:p>
@@ -1744,7 +1749,7 @@
             <a:fld id="{1D8BD707-D9CF-40AE-B4C6-C98DA3205C09}" type="datetimeFigureOut">
               <a:rPr lang="en-US" smtClean="0"/>
               <a:pPr/>
-              <a:t>9/18/2006</a:t>
+              <a:t>4/13/2015</a:t>
             </a:fld>
             <a:endParaRPr lang="en-US"/>
           </a:p>
@@ -1859,7 +1864,7 @@
             <a:fld id="{1D8BD707-D9CF-40AE-B4C6-C98DA3205C09}" type="datetimeFigureOut">
               <a:rPr lang="en-US" smtClean="0"/>
               <a:pPr/>
-              <a:t>9/18/2006</a:t>
+              <a:t>4/13/2015</a:t>
             </a:fld>
             <a:endParaRPr lang="en-US"/>
           </a:p>
@@ -1951,7 +1956,7 @@
             <a:fld id="{1D8BD707-D9CF-40AE-B4C6-C98DA3205C09}" type="datetimeFigureOut">
               <a:rPr lang="en-US" smtClean="0"/>
               <a:pPr/>
-              <a:t>9/18/2006</a:t>
+              <a:t>4/13/2015</a:t>
             </a:fld>
             <a:endParaRPr lang="en-US"/>
           </a:p>
@@ -2225,7 +2230,7 @@
             <a:fld id="{1D8BD707-D9CF-40AE-B4C6-C98DA3205C09}" type="datetimeFigureOut">
               <a:rPr lang="en-US" smtClean="0"/>
               <a:pPr/>
-              <a:t>9/18/2006</a:t>
+              <a:t>4/13/2015</a:t>
             </a:fld>
             <a:endParaRPr lang="en-US"/>
           </a:p>
@@ -2475,7 +2480,7 @@
             <a:fld id="{1D8BD707-D9CF-40AE-B4C6-C98DA3205C09}" type="datetimeFigureOut">
               <a:rPr lang="en-US" smtClean="0"/>
               <a:pPr/>
-              <a:t>9/18/2006</a:t>
+              <a:t>4/13/2015</a:t>
             </a:fld>
             <a:endParaRPr lang="en-US"/>
           </a:p>
@@ -2685,7 +2690,7 @@
             <a:fld id="{1D8BD707-D9CF-40AE-B4C6-C98DA3205C09}" type="datetimeFigureOut">
               <a:rPr lang="en-US" smtClean="0"/>
               <a:pPr/>
-              <a:t>9/18/2006</a:t>
+              <a:t>4/13/2015</a:t>
             </a:fld>
             <a:endParaRPr lang="en-US"/>
           </a:p>
@@ -3037,6 +3042,260 @@
     </p:otherStyle>
   </p:txStyles>
 </p:sldMaster>
+</file>
+
+<file path=ppt/slides/slide1.xml><?xml version="1.0" encoding="utf-8"?>
+<p:sld xmlns:a="http://schemas.openxmlformats.org/drawingml/2006/main" xmlns:r="http://schemas.openxmlformats.org/officeDocument/2006/relationships" xmlns:p="http://schemas.openxmlformats.org/presentationml/2006/main">
+  <p:cSld>
+    <p:spTree>
+      <p:nvGrpSpPr>
+        <p:cNvPr id="1" name=""/>
+        <p:cNvGrpSpPr/>
+        <p:nvPr/>
+      </p:nvGrpSpPr>
+      <p:grpSpPr>
+        <a:xfrm>
+          <a:off x="0" y="0"/>
+          <a:ext cx="0" cy="0"/>
+          <a:chOff x="0" y="0"/>
+          <a:chExt cx="0" cy="0"/>
+        </a:xfrm>
+      </p:grpSpPr>
+      <p:sp>
+        <p:nvSpPr>
+          <p:cNvPr id="2" name="Title 1"/>
+          <p:cNvSpPr>
+            <a:spLocks noGrp="1"/>
+          </p:cNvSpPr>
+          <p:nvPr>
+            <p:ph type="ctrTitle"/>
+          </p:nvPr>
+        </p:nvSpPr>
+        <p:spPr/>
+        <p:txBody>
+          <a:bodyPr/>
+          <a:lstStyle/>
+          <a:p>
+            <a:r>
+              <a:rPr lang="en-AU" dirty="0" err="1" smtClean="0"/>
+              <a:t>NodeJS</a:t>
+            </a:r>
+            <a:endParaRPr lang="en-AU" dirty="0"/>
+          </a:p>
+        </p:txBody>
+      </p:sp>
+      <p:sp>
+        <p:nvSpPr>
+          <p:cNvPr id="3" name="Subtitle 2"/>
+          <p:cNvSpPr>
+            <a:spLocks noGrp="1"/>
+          </p:cNvSpPr>
+          <p:nvPr>
+            <p:ph type="subTitle" idx="1"/>
+          </p:nvPr>
+        </p:nvSpPr>
+        <p:spPr/>
+        <p:txBody>
+          <a:bodyPr/>
+          <a:lstStyle/>
+          <a:p>
+            <a:endParaRPr lang="en-AU"/>
+          </a:p>
+        </p:txBody>
+      </p:sp>
+    </p:spTree>
+    <p:extLst>
+      <p:ext uri="{BB962C8B-B14F-4D97-AF65-F5344CB8AC3E}">
+        <p14:creationId xmlns:p14="http://schemas.microsoft.com/office/powerpoint/2010/main" val="3491802260"/>
+      </p:ext>
+    </p:extLst>
+  </p:cSld>
+  <p:clrMapOvr>
+    <a:masterClrMapping/>
+  </p:clrMapOvr>
+</p:sld>
+</file>
+
+<file path=ppt/slides/slide2.xml><?xml version="1.0" encoding="utf-8"?>
+<p:sld xmlns:a="http://schemas.openxmlformats.org/drawingml/2006/main" xmlns:r="http://schemas.openxmlformats.org/officeDocument/2006/relationships" xmlns:p="http://schemas.openxmlformats.org/presentationml/2006/main">
+  <p:cSld>
+    <p:spTree>
+      <p:nvGrpSpPr>
+        <p:cNvPr id="1" name=""/>
+        <p:cNvGrpSpPr/>
+        <p:nvPr/>
+      </p:nvGrpSpPr>
+      <p:grpSpPr>
+        <a:xfrm>
+          <a:off x="0" y="0"/>
+          <a:ext cx="0" cy="0"/>
+          <a:chOff x="0" y="0"/>
+          <a:chExt cx="0" cy="0"/>
+        </a:xfrm>
+      </p:grpSpPr>
+      <p:sp>
+        <p:nvSpPr>
+          <p:cNvPr id="2" name="Title 1"/>
+          <p:cNvSpPr>
+            <a:spLocks noGrp="1"/>
+          </p:cNvSpPr>
+          <p:nvPr>
+            <p:ph type="title"/>
+          </p:nvPr>
+        </p:nvSpPr>
+        <p:spPr/>
+        <p:txBody>
+          <a:bodyPr/>
+          <a:lstStyle/>
+          <a:p>
+            <a:r>
+              <a:rPr lang="en-AU" dirty="0" smtClean="0"/>
+              <a:t>What is it?</a:t>
+            </a:r>
+            <a:endParaRPr lang="en-AU" dirty="0"/>
+          </a:p>
+        </p:txBody>
+      </p:sp>
+      <p:sp>
+        <p:nvSpPr>
+          <p:cNvPr id="3" name="Content Placeholder 2"/>
+          <p:cNvSpPr>
+            <a:spLocks noGrp="1"/>
+          </p:cNvSpPr>
+          <p:nvPr>
+            <p:ph idx="1"/>
+          </p:nvPr>
+        </p:nvSpPr>
+        <p:spPr/>
+        <p:txBody>
+          <a:bodyPr/>
+          <a:lstStyle/>
+          <a:p>
+            <a:r>
+              <a:rPr lang="en-AU" dirty="0" smtClean="0"/>
+              <a:t>A platform built on Chrome’s JavaScript runtime environment</a:t>
+            </a:r>
+          </a:p>
+          <a:p>
+            <a:r>
+              <a:rPr lang="en-AU" dirty="0" smtClean="0"/>
+              <a:t>An asynchronous event driven framework</a:t>
+            </a:r>
+          </a:p>
+          <a:p>
+            <a:r>
+              <a:rPr lang="en-AU" dirty="0" smtClean="0"/>
+              <a:t>Designed for scalable network applications</a:t>
+            </a:r>
+            <a:endParaRPr lang="en-AU" dirty="0"/>
+          </a:p>
+        </p:txBody>
+      </p:sp>
+    </p:spTree>
+    <p:extLst>
+      <p:ext uri="{BB962C8B-B14F-4D97-AF65-F5344CB8AC3E}">
+        <p14:creationId xmlns:p14="http://schemas.microsoft.com/office/powerpoint/2010/main" val="2432992403"/>
+      </p:ext>
+    </p:extLst>
+  </p:cSld>
+  <p:clrMapOvr>
+    <a:masterClrMapping/>
+  </p:clrMapOvr>
+</p:sld>
+</file>
+
+<file path=ppt/slides/slide3.xml><?xml version="1.0" encoding="utf-8"?>
+<p:sld xmlns:a="http://schemas.openxmlformats.org/drawingml/2006/main" xmlns:r="http://schemas.openxmlformats.org/officeDocument/2006/relationships" xmlns:p="http://schemas.openxmlformats.org/presentationml/2006/main">
+  <p:cSld>
+    <p:spTree>
+      <p:nvGrpSpPr>
+        <p:cNvPr id="1" name=""/>
+        <p:cNvGrpSpPr/>
+        <p:nvPr/>
+      </p:nvGrpSpPr>
+      <p:grpSpPr>
+        <a:xfrm>
+          <a:off x="0" y="0"/>
+          <a:ext cx="0" cy="0"/>
+          <a:chOff x="0" y="0"/>
+          <a:chExt cx="0" cy="0"/>
+        </a:xfrm>
+      </p:grpSpPr>
+      <p:sp>
+        <p:nvSpPr>
+          <p:cNvPr id="2" name="Title 1"/>
+          <p:cNvSpPr>
+            <a:spLocks noGrp="1"/>
+          </p:cNvSpPr>
+          <p:nvPr>
+            <p:ph type="title"/>
+          </p:nvPr>
+        </p:nvSpPr>
+        <p:spPr/>
+        <p:txBody>
+          <a:bodyPr/>
+          <a:lstStyle/>
+          <a:p>
+            <a:r>
+              <a:rPr lang="en-AU" dirty="0" smtClean="0"/>
+              <a:t>Event model</a:t>
+            </a:r>
+            <a:endParaRPr lang="en-AU" dirty="0"/>
+          </a:p>
+        </p:txBody>
+      </p:sp>
+      <p:pic>
+        <p:nvPicPr>
+          <p:cNvPr id="1026" name="Picture 2" descr="http://i.stack.imgur.com/YCTgK.png"/>
+          <p:cNvPicPr>
+            <a:picLocks noChangeAspect="1" noChangeArrowheads="1"/>
+          </p:cNvPicPr>
+          <p:nvPr/>
+        </p:nvPicPr>
+        <p:blipFill>
+          <a:blip r:embed="rId2">
+            <a:extLst>
+              <a:ext uri="{28A0092B-C50C-407E-A947-70E740481C1C}">
+                <a14:useLocalDpi xmlns:a14="http://schemas.microsoft.com/office/drawing/2010/main" val="0"/>
+              </a:ext>
+            </a:extLst>
+          </a:blip>
+          <a:srcRect/>
+          <a:stretch>
+            <a:fillRect/>
+          </a:stretch>
+        </p:blipFill>
+        <p:spPr bwMode="auto">
+          <a:xfrm>
+            <a:off x="1247775" y="1729944"/>
+            <a:ext cx="6524625" cy="4123283"/>
+          </a:xfrm>
+          <a:prstGeom prst="rect">
+            <a:avLst/>
+          </a:prstGeom>
+          <a:noFill/>
+          <a:extLst>
+            <a:ext uri="{909E8E84-426E-40DD-AFC4-6F175D3DCCD1}">
+              <a14:hiddenFill xmlns:a14="http://schemas.microsoft.com/office/drawing/2010/main">
+                <a:solidFill>
+                  <a:srgbClr val="FFFFFF"/>
+                </a:solidFill>
+              </a14:hiddenFill>
+            </a:ext>
+          </a:extLst>
+        </p:spPr>
+      </p:pic>
+    </p:spTree>
+    <p:extLst>
+      <p:ext uri="{BB962C8B-B14F-4D97-AF65-F5344CB8AC3E}">
+        <p14:creationId xmlns:p14="http://schemas.microsoft.com/office/powerpoint/2010/main" val="4075815120"/>
+      </p:ext>
+    </p:extLst>
+  </p:cSld>
+  <p:clrMapOvr>
+    <a:masterClrMapping/>
+  </p:clrMapOvr>
+</p:sld>
 </file>
 
 <file path=ppt/theme/theme1.xml><?xml version="1.0" encoding="utf-8"?>

</xml_diff>